<commit_message>
Added draft of new LUIS lab
</commit_message>
<xml_diff>
--- a/Workshop/14. LUIS/LUIS.pptx
+++ b/Workshop/14. LUIS/LUIS.pptx
@@ -225,7 +225,7 @@
           <a:p>
             <a:fld id="{49B60EF2-7028-489F-85D8-FE86CD7CF2A0}" type="datetimeFigureOut">
               <a:rPr lang="en-US" smtClean="0"/>
-              <a:t>11/28/2016</a:t>
+              <a:t>5/25/2017</a:t>
             </a:fld>
             <a:endParaRPr lang="en-US"/>
           </a:p>
@@ -1616,7 +1616,7 @@
             </a:r>
             <a:r>
               <a:rPr lang="en-US" baseline="0" dirty="0"/>
-              <a:t> general process for creating and configuring a LUIS application starts with either creating a custom model, or using a pre-built model, then deploying or “publishing” your model to an HTTP endpoint that is then accessible via your application. NOTE: Although models can be shared in an application, models cannot be combined or nested into parent models. If you want to include both custom and pre-built models in your application, these need to be setup as spate applications. This is not true, however for entities. Custom and pre-built entities can be combined as needed.</a:t>
+              <a:t> general process for creating and configuring a LUIS application starts with either creating a custom model, or using a prebuilt model, then deploying or “publishing” your model to an HTTP endpoint that is then accessible via your application. NOTE: Although models can be shared in an application, models cannot be combined or nested into parent models. If you want to include both custom and prebuilt models in your application, these need to be setup as spate applications. This is not true, however for entities. Custom and prebuilt entities can be combined as needed.</a:t>
             </a:r>
             <a:endParaRPr lang="en-US" dirty="0"/>
           </a:p>
@@ -1704,13 +1704,13 @@
           <a:p>
             <a:r>
               <a:rPr lang="en-US" dirty="0"/>
-              <a:t>LUIS includes a set of pre-built entities. When a pre-built entity is included in your application, its predictions will be included in your published application, as well as in the LUIS web UI while labeling.</a:t>
+              <a:t>LUIS includes a set of prebuilt entities. When a prebuilt entity is included in your application, its predictions will be included in your published application, as well as in the LUIS web UI while labeling.</a:t>
             </a:r>
           </a:p>
           <a:p>
             <a:r>
               <a:rPr lang="en-US" dirty="0"/>
-              <a:t>NOTE: The behavior of pre-built entities cannot be modified. Most pre-built entity are available in all LUIS application locales (cultures). Many of the pre-built entity sets, such as geography and encyclopedia contain</a:t>
+              <a:t>NOTE: The behavior of prebuilt entities cannot be modified. Most prebuilt entity are available in all LUIS application locales (cultures). Many of the prebuilt entity sets, such as geography and encyclopedia contain</a:t>
             </a:r>
             <a:r>
               <a:rPr lang="en-US" baseline="0" dirty="0"/>
@@ -1872,7 +1872,6 @@
               <a:rPr lang="en-US" dirty="0"/>
               <a:t>", and then clicking the search icon. </a:t>
             </a:r>
-            <a:endParaRPr lang="en-US" dirty="0"/>
           </a:p>
         </p:txBody>
       </p:sp>
@@ -1960,7 +1959,6 @@
               <a:rPr lang="en-US" dirty="0"/>
               <a:t>When you "train" a model, LUIS generalizes from the examples you have labeled, and develops code to recognize the relevant intents and entities in the future. Internally, LUIS uses logistic regression classifiers to determine intents, and conditional random fields (CRFs) to determine the entities. The training process results in optimized classifiers and CRFs, referred to as models, that LUIS can use in the future. To begin training, just click the "Train" button in a LUIS application. NOTE: Training also automatically occurs periodically. </a:t>
             </a:r>
-            <a:endParaRPr lang="en-US" dirty="0"/>
           </a:p>
         </p:txBody>
       </p:sp>
@@ -2255,7 +2253,7 @@
           <a:p>
             <a:fld id="{0459C166-16D3-4A25-A2F8-C51E0E346B22}" type="datetimeFigureOut">
               <a:rPr lang="en-US" smtClean="0"/>
-              <a:t>11/28/2016</a:t>
+              <a:t>5/25/2017</a:t>
             </a:fld>
             <a:endParaRPr lang="en-US"/>
           </a:p>
@@ -2350,7 +2348,7 @@
           <a:p>
             <a:fld id="{0459C166-16D3-4A25-A2F8-C51E0E346B22}" type="datetimeFigureOut">
               <a:rPr lang="en-US" smtClean="0"/>
-              <a:t>11/28/2016</a:t>
+              <a:t>5/25/2017</a:t>
             </a:fld>
             <a:endParaRPr lang="en-US"/>
           </a:p>
@@ -2625,7 +2623,7 @@
           <a:p>
             <a:fld id="{0459C166-16D3-4A25-A2F8-C51E0E346B22}" type="datetimeFigureOut">
               <a:rPr lang="en-US" smtClean="0"/>
-              <a:t>11/28/2016</a:t>
+              <a:t>5/25/2017</a:t>
             </a:fld>
             <a:endParaRPr lang="en-US"/>
           </a:p>
@@ -2877,7 +2875,7 @@
           <a:p>
             <a:fld id="{0459C166-16D3-4A25-A2F8-C51E0E346B22}" type="datetimeFigureOut">
               <a:rPr lang="en-US" smtClean="0"/>
-              <a:t>11/28/2016</a:t>
+              <a:t>5/25/2017</a:t>
             </a:fld>
             <a:endParaRPr lang="en-US"/>
           </a:p>
@@ -3045,7 +3043,7 @@
           <a:p>
             <a:fld id="{0459C166-16D3-4A25-A2F8-C51E0E346B22}" type="datetimeFigureOut">
               <a:rPr lang="en-US" smtClean="0"/>
-              <a:t>11/28/2016</a:t>
+              <a:t>5/25/2017</a:t>
             </a:fld>
             <a:endParaRPr lang="en-US"/>
           </a:p>
@@ -3223,7 +3221,7 @@
           <a:p>
             <a:fld id="{0459C166-16D3-4A25-A2F8-C51E0E346B22}" type="datetimeFigureOut">
               <a:rPr lang="en-US" smtClean="0"/>
-              <a:t>11/28/2016</a:t>
+              <a:t>5/25/2017</a:t>
             </a:fld>
             <a:endParaRPr lang="en-US"/>
           </a:p>
@@ -5128,7 +5126,7 @@
           <a:p>
             <a:fld id="{0459C166-16D3-4A25-A2F8-C51E0E346B22}" type="datetimeFigureOut">
               <a:rPr lang="en-US" smtClean="0"/>
-              <a:t>11/28/2016</a:t>
+              <a:t>5/25/2017</a:t>
             </a:fld>
             <a:endParaRPr lang="en-US"/>
           </a:p>
@@ -10692,7 +10690,7 @@
             <a:fld id="{0459C166-16D3-4A25-A2F8-C51E0E346B22}" type="datetimeFigureOut">
               <a:rPr lang="en-US" smtClean="0"/>
               <a:pPr/>
-              <a:t>11/28/2016</a:t>
+              <a:t>5/25/2017</a:t>
             </a:fld>
             <a:endParaRPr lang="en-US"/>
           </a:p>
@@ -14613,7 +14611,7 @@
           <a:p>
             <a:fld id="{0459C166-16D3-4A25-A2F8-C51E0E346B22}" type="datetimeFigureOut">
               <a:rPr lang="en-US" smtClean="0"/>
-              <a:t>11/28/2016</a:t>
+              <a:t>5/25/2017</a:t>
             </a:fld>
             <a:endParaRPr lang="en-US"/>
           </a:p>
@@ -14977,7 +14975,7 @@
           <a:p>
             <a:fld id="{0459C166-16D3-4A25-A2F8-C51E0E346B22}" type="datetimeFigureOut">
               <a:rPr lang="en-US" smtClean="0"/>
-              <a:t>11/28/2016</a:t>
+              <a:t>5/25/2017</a:t>
             </a:fld>
             <a:endParaRPr lang="en-US"/>
           </a:p>
@@ -15094,7 +15092,7 @@
           <a:p>
             <a:fld id="{0459C166-16D3-4A25-A2F8-C51E0E346B22}" type="datetimeFigureOut">
               <a:rPr lang="en-US" smtClean="0"/>
-              <a:t>11/28/2016</a:t>
+              <a:t>5/25/2017</a:t>
             </a:fld>
             <a:endParaRPr lang="en-US"/>
           </a:p>
@@ -15305,7 +15303,7 @@
           <a:p>
             <a:fld id="{0459C166-16D3-4A25-A2F8-C51E0E346B22}" type="datetimeFigureOut">
               <a:rPr lang="en-US" smtClean="0"/>
-              <a:t>11/28/2016</a:t>
+              <a:t>5/25/2017</a:t>
             </a:fld>
             <a:endParaRPr lang="en-US"/>
           </a:p>
@@ -16593,7 +16591,6 @@
               <a:rPr lang="en-US" dirty="0"/>
               <a:t>Microsoft Language Understanding Intelligent Service (LUIS)</a:t>
             </a:r>
-            <a:endParaRPr lang="en-US" dirty="0"/>
           </a:p>
         </p:txBody>
       </p:sp>
@@ -16770,14 +16767,14 @@
           </p:nvSpPr>
           <p:spPr>
             <a:xfrm>
-              <a:off x="6272945" y="3120685"/>
-              <a:ext cx="542534" cy="1024787"/>
+              <a:off x="6272945" y="3398210"/>
+              <a:ext cx="542534" cy="747263"/>
             </a:xfrm>
             <a:prstGeom prst="rightArrow">
               <a:avLst/>
             </a:prstGeom>
             <a:solidFill>
-              <a:srgbClr val="00B294"/>
+              <a:srgbClr val="004B50"/>
             </a:solidFill>
             <a:ln>
               <a:solidFill>
@@ -18432,8 +18429,8 @@
         </p:nvSpPr>
         <p:spPr>
           <a:xfrm>
-            <a:off x="8516560" y="2224128"/>
-            <a:ext cx="2829320" cy="3624933"/>
+            <a:off x="8516560" y="2076988"/>
+            <a:ext cx="2829320" cy="3924424"/>
           </a:xfrm>
           <a:prstGeom prst="rect">
             <a:avLst/>
@@ -18540,6 +18537,26 @@
               <a:t>Kik</a:t>
             </a:r>
             <a:endParaRPr lang="en-US" sz="1600" dirty="0"/>
+          </a:p>
+          <a:p>
+            <a:pPr marL="742950" lvl="1" indent="-285750">
+              <a:buFont typeface="Arial" panose="020B0604020202020204" pitchFamily="34" charset="0"/>
+              <a:buChar char="•"/>
+            </a:pPr>
+            <a:r>
+              <a:rPr lang="en-US" sz="1600" dirty="0"/>
+              <a:t>Microsoft Teams</a:t>
+            </a:r>
+          </a:p>
+          <a:p>
+            <a:pPr marL="742950" lvl="1" indent="-285750">
+              <a:buFont typeface="Arial" panose="020B0604020202020204" pitchFamily="34" charset="0"/>
+              <a:buChar char="•"/>
+            </a:pPr>
+            <a:r>
+              <a:rPr lang="en-US" sz="1600" dirty="0"/>
+              <a:t>Cortana</a:t>
+            </a:r>
           </a:p>
           <a:p>
             <a:pPr marL="742950" lvl="1" indent="-285750">
@@ -18760,7 +18777,7 @@
         <p:spPr>
           <a:xfrm>
             <a:off x="7986380" y="4036594"/>
-            <a:ext cx="530180" cy="1"/>
+            <a:ext cx="530180" cy="2606"/>
           </a:xfrm>
           <a:prstGeom prst="straightConnector1">
             <a:avLst/>
@@ -19139,9 +19156,57 @@
           </a:p>
         </p:txBody>
       </p:sp>
+      <p:sp>
+        <p:nvSpPr>
+          <p:cNvPr id="13" name="Content Placeholder 2"/>
+          <p:cNvSpPr>
+            <a:spLocks noGrp="1"/>
+          </p:cNvSpPr>
+          <p:nvPr>
+            <p:ph idx="1"/>
+          </p:nvPr>
+        </p:nvSpPr>
+        <p:spPr>
+          <a:xfrm>
+            <a:off x="838199" y="1825625"/>
+            <a:ext cx="3379026" cy="4200826"/>
+          </a:xfrm>
+        </p:spPr>
+        <p:txBody>
+          <a:bodyPr>
+            <a:normAutofit/>
+          </a:bodyPr>
+          <a:lstStyle/>
+          <a:p>
+            <a:pPr marL="0" indent="0">
+              <a:buNone/>
+            </a:pPr>
+            <a:r>
+              <a:rPr lang="en-US" dirty="0"/>
+              <a:t>Channels are currently available for Skype, web, email, Cortana, Microsoft Teams, Facebook, </a:t>
+            </a:r>
+            <a:r>
+              <a:rPr lang="en-US" dirty="0" err="1"/>
+              <a:t>GroupMe</a:t>
+            </a:r>
+            <a:r>
+              <a:rPr lang="en-US" dirty="0"/>
+              <a:t>, </a:t>
+            </a:r>
+            <a:r>
+              <a:rPr lang="en-US" dirty="0" err="1"/>
+              <a:t>Kik</a:t>
+            </a:r>
+            <a:r>
+              <a:rPr lang="en-US" dirty="0"/>
+              <a:t>, Slack, Telegram, Twilio, and direct line app integration.</a:t>
+            </a:r>
+          </a:p>
+        </p:txBody>
+      </p:sp>
       <p:pic>
         <p:nvPicPr>
-          <p:cNvPr id="9" name="Picture 8"/>
+          <p:cNvPr id="3" name="Picture 2"/>
           <p:cNvPicPr>
             <a:picLocks noChangeAspect="1"/>
           </p:cNvPicPr>
@@ -19155,8 +19220,8 @@
         </p:blipFill>
         <p:spPr>
           <a:xfrm>
-            <a:off x="4168230" y="1825625"/>
-            <a:ext cx="4595483" cy="4113440"/>
+            <a:off x="4658659" y="1825625"/>
+            <a:ext cx="6051382" cy="4207602"/>
           </a:xfrm>
           <a:prstGeom prst="rect">
             <a:avLst/>
@@ -19171,125 +19236,6 @@
           </a:ln>
         </p:spPr>
       </p:pic>
-      <p:grpSp>
-        <p:nvGrpSpPr>
-          <p:cNvPr id="10" name="Group 9"/>
-          <p:cNvGrpSpPr/>
-          <p:nvPr/>
-        </p:nvGrpSpPr>
-        <p:grpSpPr>
-          <a:xfrm>
-            <a:off x="6096000" y="2656837"/>
-            <a:ext cx="5058211" cy="3417165"/>
-            <a:chOff x="4009588" y="1809888"/>
-            <a:chExt cx="5058211" cy="3417165"/>
-          </a:xfrm>
-        </p:grpSpPr>
-        <p:pic>
-          <p:nvPicPr>
-            <p:cNvPr id="11" name="Picture 10"/>
-            <p:cNvPicPr>
-              <a:picLocks noChangeAspect="1"/>
-            </p:cNvPicPr>
-            <p:nvPr/>
-          </p:nvPicPr>
-          <p:blipFill>
-            <a:blip r:embed="rId4"/>
-            <a:stretch>
-              <a:fillRect/>
-            </a:stretch>
-          </p:blipFill>
-          <p:spPr>
-            <a:xfrm>
-              <a:off x="4009588" y="1809888"/>
-              <a:ext cx="4042160" cy="2533511"/>
-            </a:xfrm>
-            <a:prstGeom prst="rect">
-              <a:avLst/>
-            </a:prstGeom>
-            <a:ln>
-              <a:solidFill>
-                <a:schemeClr val="tx1">
-                  <a:lumMod val="85000"/>
-                  <a:lumOff val="15000"/>
-                </a:schemeClr>
-              </a:solidFill>
-            </a:ln>
-          </p:spPr>
-        </p:pic>
-        <p:pic>
-          <p:nvPicPr>
-            <p:cNvPr id="12" name="Picture 11"/>
-            <p:cNvPicPr>
-              <a:picLocks noChangeAspect="1"/>
-            </p:cNvPicPr>
-            <p:nvPr/>
-          </p:nvPicPr>
-          <p:blipFill>
-            <a:blip r:embed="rId5"/>
-            <a:stretch>
-              <a:fillRect/>
-            </a:stretch>
-          </p:blipFill>
-          <p:spPr>
-            <a:xfrm>
-              <a:off x="4427076" y="2315226"/>
-              <a:ext cx="4640723" cy="2911827"/>
-            </a:xfrm>
-            <a:prstGeom prst="rect">
-              <a:avLst/>
-            </a:prstGeom>
-          </p:spPr>
-        </p:pic>
-      </p:grpSp>
-      <p:sp>
-        <p:nvSpPr>
-          <p:cNvPr id="13" name="Content Placeholder 2"/>
-          <p:cNvSpPr>
-            <a:spLocks noGrp="1"/>
-          </p:cNvSpPr>
-          <p:nvPr>
-            <p:ph idx="1"/>
-          </p:nvPr>
-        </p:nvSpPr>
-        <p:spPr>
-          <a:xfrm>
-            <a:off x="838199" y="1825625"/>
-            <a:ext cx="2861441" cy="4200826"/>
-          </a:xfrm>
-        </p:spPr>
-        <p:txBody>
-          <a:bodyPr>
-            <a:normAutofit/>
-          </a:bodyPr>
-          <a:lstStyle/>
-          <a:p>
-            <a:pPr marL="0" indent="0">
-              <a:buNone/>
-            </a:pPr>
-            <a:r>
-              <a:rPr lang="en-US" dirty="0"/>
-              <a:t>Channels are currently available for Skype, web, email, Facebook, </a:t>
-            </a:r>
-            <a:r>
-              <a:rPr lang="en-US" dirty="0" err="1"/>
-              <a:t>GroupMe</a:t>
-            </a:r>
-            <a:r>
-              <a:rPr lang="en-US" dirty="0"/>
-              <a:t>, </a:t>
-            </a:r>
-            <a:r>
-              <a:rPr lang="en-US" dirty="0" err="1"/>
-              <a:t>Kik</a:t>
-            </a:r>
-            <a:r>
-              <a:rPr lang="en-US" dirty="0"/>
-              <a:t>, Slack, Telegram, Twilio, and direct line app integration.</a:t>
-            </a:r>
-          </a:p>
-        </p:txBody>
-      </p:sp>
     </p:spTree>
     <p:extLst>
       <p:ext uri="{BB962C8B-B14F-4D97-AF65-F5344CB8AC3E}">
@@ -19446,7 +19392,6 @@
               <a:rPr lang="en-US" dirty="0"/>
               <a:t>Microsoft Language Understanding Intelligent Service (LUIS)</a:t>
             </a:r>
-            <a:endParaRPr lang="en-US" dirty="0"/>
           </a:p>
         </p:txBody>
       </p:sp>
@@ -19479,13 +19424,12 @@
               <a:rPr lang="en-US" dirty="0"/>
               <a:t>Language Understanding Intelligent Service (LUIS) is an interactive machine learning and language understanding technology and toolset designed to easily add language understanding and semantic interpretation to applications.</a:t>
             </a:r>
-            <a:endParaRPr lang="en-US" dirty="0"/>
           </a:p>
         </p:txBody>
       </p:sp>
       <p:pic>
         <p:nvPicPr>
-          <p:cNvPr id="5" name="Picture 4"/>
+          <p:cNvPr id="6" name="Picture 5"/>
           <p:cNvPicPr>
             <a:picLocks noChangeAspect="1"/>
           </p:cNvPicPr>
@@ -19500,19 +19444,11 @@
         <p:spPr>
           <a:xfrm>
             <a:off x="6013655" y="2136515"/>
-            <a:ext cx="5562047" cy="3433362"/>
+            <a:ext cx="5430142" cy="2777129"/>
           </a:xfrm>
           <a:prstGeom prst="rect">
             <a:avLst/>
           </a:prstGeom>
-          <a:ln>
-            <a:solidFill>
-              <a:schemeClr val="tx1">
-                <a:lumMod val="85000"/>
-                <a:lumOff val="15000"/>
-              </a:schemeClr>
-            </a:solidFill>
-          </a:ln>
         </p:spPr>
       </p:pic>
     </p:spTree>
@@ -20324,7 +20260,7 @@
       </p:sp>
       <p:pic>
         <p:nvPicPr>
-          <p:cNvPr id="7" name="Picture 6"/>
+          <p:cNvPr id="3" name="Picture 2"/>
           <p:cNvPicPr>
             <a:picLocks noChangeAspect="1"/>
           </p:cNvPicPr>
@@ -20338,8 +20274,8 @@
         </p:blipFill>
         <p:spPr>
           <a:xfrm>
-            <a:off x="4982075" y="1914075"/>
-            <a:ext cx="5930435" cy="3408778"/>
+            <a:off x="4321695" y="1914075"/>
+            <a:ext cx="6836909" cy="3578196"/>
           </a:xfrm>
           <a:prstGeom prst="rect">
             <a:avLst/>
@@ -20347,7 +20283,40 @@
           <a:ln>
             <a:solidFill>
               <a:schemeClr val="tx1">
-                <a:lumMod val="50000"/>
+                <a:lumMod val="95000"/>
+                <a:lumOff val="5000"/>
+              </a:schemeClr>
+            </a:solidFill>
+          </a:ln>
+        </p:spPr>
+      </p:pic>
+      <p:pic>
+        <p:nvPicPr>
+          <p:cNvPr id="4" name="Picture 3"/>
+          <p:cNvPicPr>
+            <a:picLocks noChangeAspect="1"/>
+          </p:cNvPicPr>
+          <p:nvPr/>
+        </p:nvPicPr>
+        <p:blipFill>
+          <a:blip r:embed="rId4"/>
+          <a:stretch>
+            <a:fillRect/>
+          </a:stretch>
+        </p:blipFill>
+        <p:spPr>
+          <a:xfrm>
+            <a:off x="7602403" y="2833758"/>
+            <a:ext cx="3751397" cy="3283263"/>
+          </a:xfrm>
+          <a:prstGeom prst="rect">
+            <a:avLst/>
+          </a:prstGeom>
+          <a:ln>
+            <a:solidFill>
+              <a:schemeClr val="tx1">
+                <a:lumMod val="95000"/>
+                <a:lumOff val="5000"/>
               </a:schemeClr>
             </a:solidFill>
           </a:ln>
@@ -20476,7 +20445,6 @@
                 <a:rPr lang="en-US" dirty="0"/>
                 <a:t>Create language understanding models.</a:t>
               </a:r>
-              <a:endParaRPr lang="en-US" dirty="0"/>
             </a:p>
           </p:txBody>
         </p:sp>
@@ -20549,9 +20517,8 @@
             <a:p>
               <a:r>
                 <a:rPr lang="en-US" dirty="0"/>
-                <a:t>Use pre-built models from Bing and Cortana.</a:t>
+                <a:t>Use prebuilt models from Bing and Cortana.</a:t>
               </a:r>
-              <a:endParaRPr lang="en-US" dirty="0"/>
             </a:p>
           </p:txBody>
         </p:sp>
@@ -20626,7 +20593,6 @@
                 <a:rPr lang="en-US" dirty="0"/>
                 <a:t>Deploy your models to an HTTP endpoint.</a:t>
               </a:r>
-              <a:endParaRPr lang="en-US" dirty="0"/>
             </a:p>
           </p:txBody>
         </p:sp>
@@ -20701,7 +20667,6 @@
                 <a:rPr lang="en-US" dirty="0"/>
                 <a:t>Access models on any device.</a:t>
               </a:r>
-              <a:endParaRPr lang="en-US" dirty="0"/>
             </a:p>
           </p:txBody>
         </p:sp>
@@ -20721,7 +20686,7 @@
             <a:avLst/>
           </a:prstGeom>
           <a:solidFill>
-            <a:srgbClr val="00B294"/>
+            <a:srgbClr val="004B50"/>
           </a:solidFill>
           <a:ln>
             <a:solidFill>
@@ -20773,7 +20738,7 @@
             <a:avLst/>
           </a:prstGeom>
           <a:solidFill>
-            <a:srgbClr val="00B294"/>
+            <a:srgbClr val="004B50"/>
           </a:solidFill>
           <a:ln>
             <a:solidFill>
@@ -20825,7 +20790,7 @@
             <a:avLst/>
           </a:prstGeom>
           <a:solidFill>
-            <a:srgbClr val="00B294"/>
+            <a:srgbClr val="004B50"/>
           </a:solidFill>
           <a:ln>
             <a:solidFill>
@@ -20909,7 +20874,7 @@
           <a:p>
             <a:r>
               <a:rPr lang="en-US" dirty="0"/>
-              <a:t>Pre-built Entities</a:t>
+              <a:t>Prebuilt Entities</a:t>
             </a:r>
             <a:endParaRPr lang="en-US" sz="3921" dirty="0"/>
           </a:p>
@@ -20924,7 +20889,7 @@
           <p:nvPr>
             <p:extLst>
               <p:ext uri="{D42A27DB-BD31-4B8C-83A1-F6EECF244321}">
-                <p14:modId xmlns:p14="http://schemas.microsoft.com/office/powerpoint/2010/main" val="1633580607"/>
+                <p14:modId xmlns:p14="http://schemas.microsoft.com/office/powerpoint/2010/main" val="3847361097"/>
               </p:ext>
             </p:extLst>
           </p:nvPr>
@@ -20994,7 +20959,7 @@
                       <a:tailEnd type="none" w="med" len="med"/>
                     </a:lnB>
                     <a:solidFill>
-                      <a:srgbClr val="00B294"/>
+                      <a:srgbClr val="004B50"/>
                     </a:solidFill>
                   </a:tcPr>
                 </a:tc>
@@ -21038,7 +21003,7 @@
                       <a:tailEnd type="none" w="med" len="med"/>
                     </a:lnB>
                     <a:solidFill>
-                      <a:srgbClr val="00B294"/>
+                      <a:srgbClr val="004B50"/>
                     </a:solidFill>
                   </a:tcPr>
                 </a:tc>
@@ -21073,7 +21038,7 @@
                       <a:tailEnd type="none" w="med" len="med"/>
                     </a:lnB>
                     <a:solidFill>
-                      <a:srgbClr val="00B294"/>
+                      <a:srgbClr val="004B50"/>
                     </a:solidFill>
                   </a:tcPr>
                 </a:tc>
@@ -21133,13 +21098,8 @@
                     <a:p>
                       <a:r>
                         <a:rPr lang="en-US" sz="1200" i="1" dirty="0"/>
-                        <a:t>ten, </a:t>
+                        <a:t>ten, 3.1415</a:t>
                       </a:r>
-                      <a:r>
-                        <a:rPr lang="en-US" sz="1200" i="1" dirty="0"/>
-                        <a:t>3.1415</a:t>
-                      </a:r>
-                      <a:endParaRPr lang="en-US" sz="1200" i="1" dirty="0"/>
                     </a:p>
                   </a:txBody>
                   <a:tcPr>
@@ -21198,7 +21158,6 @@
                         <a:rPr lang="en-US" sz="1200" dirty="0"/>
                         <a:t>", "entity": "ten" }</a:t>
                       </a:r>
-                      <a:endParaRPr lang="en-US" sz="1200" dirty="0"/>
                     </a:p>
                   </a:txBody>
                   <a:tcPr>
@@ -21352,7 +21311,6 @@
                         <a:rPr lang="en-US" sz="1200" dirty="0"/>
                         <a:t>", "entity": "10th" }</a:t>
                       </a:r>
-                      <a:endParaRPr lang="en-US" sz="1200" dirty="0"/>
                     </a:p>
                   </a:txBody>
                   <a:tcPr>
@@ -21451,7 +21409,6 @@
                         <a:rPr lang="en-US" sz="1200" i="1" dirty="0"/>
                         <a:t>, 78 F</a:t>
                       </a:r>
-                      <a:endParaRPr lang="en-US" sz="1200" i="1" dirty="0"/>
                     </a:p>
                   </a:txBody>
                   <a:tcPr>
@@ -21510,7 +21467,6 @@
                         <a:rPr lang="en-US" sz="1200" dirty="0"/>
                         <a:t>", "entity": "78 f" }</a:t>
                       </a:r>
-                      <a:endParaRPr lang="en-US" sz="1200" dirty="0"/>
                     </a:p>
                   </a:txBody>
                   <a:tcPr>
@@ -21609,7 +21565,6 @@
                         <a:rPr lang="en-US" sz="1200" i="1" dirty="0"/>
                         <a:t>650 square kilometers</a:t>
                       </a:r>
-                      <a:endParaRPr lang="en-US" sz="1200" i="1" dirty="0"/>
                     </a:p>
                   </a:txBody>
                   <a:tcPr>
@@ -21668,7 +21623,6 @@
                         <a:rPr lang="en-US" sz="1200" dirty="0"/>
                         <a:t>", "entity": "2 miles" }</a:t>
                       </a:r>
-                      <a:endParaRPr lang="en-US" sz="1200" dirty="0"/>
                     </a:p>
                   </a:txBody>
                   <a:tcPr>
@@ -21759,7 +21713,6 @@
                         <a:rPr lang="en-US" sz="1200" i="1" dirty="0"/>
                         <a:t>1000.00 US dollars, $ 67.5 B</a:t>
                       </a:r>
-                      <a:endParaRPr lang="en-US" sz="1200" i="1" dirty="0"/>
                     </a:p>
                   </a:txBody>
                   <a:tcPr>
@@ -21818,7 +21771,6 @@
                         <a:rPr lang="en-US" sz="1200" dirty="0"/>
                         <a:t>", "entity": "1000.00 us dollars" }</a:t>
                       </a:r>
-                      <a:endParaRPr lang="en-US" sz="1200" dirty="0"/>
                     </a:p>
                   </a:txBody>
                   <a:tcPr>
@@ -21909,7 +21861,6 @@
                         <a:rPr lang="en-US" sz="1200" i="1" dirty="0"/>
                         <a:t>100 year old, 10 years old</a:t>
                       </a:r>
-                      <a:endParaRPr lang="en-US" sz="1200" i="1" dirty="0"/>
                     </a:p>
                   </a:txBody>
                   <a:tcPr>
@@ -21968,7 +21919,6 @@
                         <a:rPr lang="en-US" sz="1200" dirty="0"/>
                         <a:t>", "entity": "100 year old" }</a:t>
                       </a:r>
-                      <a:endParaRPr lang="en-US" sz="1200" dirty="0"/>
                     </a:p>
                   </a:txBody>
                   <a:tcPr>
@@ -22063,7 +22013,6 @@
                         <a:rPr lang="en-US" sz="1200" i="1" dirty="0"/>
                         <a:t>, amazon river</a:t>
                       </a:r>
-                      <a:endParaRPr lang="en-US" sz="1200" i="1" dirty="0"/>
                     </a:p>
                   </a:txBody>
                   <a:tcPr>
@@ -22130,7 +22079,6 @@
                         <a:rPr lang="en-US" sz="1200" dirty="0"/>
                         <a:t>" }</a:t>
                       </a:r>
-                      <a:endParaRPr lang="en-US" sz="1200" dirty="0"/>
                     </a:p>
                   </a:txBody>
                   <a:tcPr>
@@ -22233,7 +22181,6 @@
                         <a:rPr lang="en-US" sz="1200" i="1" dirty="0"/>
                         <a:t>super bowl xxxix</a:t>
                       </a:r>
-                      <a:endParaRPr lang="en-US" sz="1200" i="1" dirty="0"/>
                     </a:p>
                   </a:txBody>
                   <a:tcPr>
@@ -22317,7 +22264,6 @@
                         <a:rPr lang="en-US" sz="1200" dirty="0"/>
                         <a:t> lee" }</a:t>
                       </a:r>
-                      <a:endParaRPr lang="en-US" sz="1200" dirty="0"/>
                     </a:p>
                   </a:txBody>
                   <a:tcPr>
@@ -22399,7 +22345,6 @@
                         <a:rPr lang="en-US" sz="1200" i="1" dirty="0"/>
                         <a:t>tomorrow, the meeting ends at 5:30 PM</a:t>
                       </a:r>
-                      <a:endParaRPr lang="en-US" sz="1200" i="1" dirty="0"/>
                     </a:p>
                   </a:txBody>
                   <a:tcPr>
@@ -22449,7 +22394,6 @@
                         <a:rPr lang="en-US" sz="1200" dirty="0"/>
                         <a:t>", "entity": "tomorrow", "resolution": { "date": "2015-08-15" } }</a:t>
                       </a:r>
-                      <a:endParaRPr lang="en-US" sz="1200" dirty="0"/>
                     </a:p>
                   </a:txBody>
                   <a:tcPr>
@@ -22674,9 +22618,8 @@
             </a:pPr>
             <a:r>
               <a:rPr lang="en-US" dirty="0"/>
-              <a:t>LUIS includes a set of pre-built entities. When a pre-built entity is included in your application, its predictions will be included in your published app.</a:t>
-            </a:r>
-            <a:endParaRPr lang="en-US" dirty="0"/>
+              <a:t>LUIS includes a set of prebuilt entities. When a prebuilt entity is included in your application, its predictions will be included in your published app.</a:t>
+            </a:r>
           </a:p>
         </p:txBody>
       </p:sp>
@@ -22990,22 +22933,21 @@
       </p:sp>
       <p:pic>
         <p:nvPicPr>
-          <p:cNvPr id="5" name="Picture 4"/>
+          <p:cNvPr id="3" name="Picture 2"/>
           <p:cNvPicPr>
             <a:picLocks noChangeAspect="1"/>
           </p:cNvPicPr>
           <p:nvPr/>
         </p:nvPicPr>
-        <p:blipFill>
+        <p:blipFill rotWithShape="1">
           <a:blip r:embed="rId3"/>
-          <a:stretch>
-            <a:fillRect/>
-          </a:stretch>
+          <a:srcRect r="40630"/>
+          <a:stretch/>
         </p:blipFill>
         <p:spPr>
           <a:xfrm>
-            <a:off x="4895411" y="1860256"/>
-            <a:ext cx="4926683" cy="3897227"/>
+            <a:off x="4954501" y="2069358"/>
+            <a:ext cx="4683486" cy="3389289"/>
           </a:xfrm>
           <a:prstGeom prst="rect">
             <a:avLst/>
@@ -23019,6 +22961,89 @@
           </a:ln>
         </p:spPr>
       </p:pic>
+      <p:pic>
+        <p:nvPicPr>
+          <p:cNvPr id="4" name="Picture 3"/>
+          <p:cNvPicPr>
+            <a:picLocks noChangeAspect="1"/>
+          </p:cNvPicPr>
+          <p:nvPr/>
+        </p:nvPicPr>
+        <p:blipFill>
+          <a:blip r:embed="rId4"/>
+          <a:stretch>
+            <a:fillRect/>
+          </a:stretch>
+        </p:blipFill>
+        <p:spPr>
+          <a:xfrm>
+            <a:off x="6649048" y="2664669"/>
+            <a:ext cx="3977010" cy="3473372"/>
+          </a:xfrm>
+          <a:prstGeom prst="rect">
+            <a:avLst/>
+          </a:prstGeom>
+          <a:ln>
+            <a:solidFill>
+              <a:schemeClr val="tx1">
+                <a:lumMod val="50000"/>
+              </a:schemeClr>
+            </a:solidFill>
+          </a:ln>
+        </p:spPr>
+      </p:pic>
+      <p:sp>
+        <p:nvSpPr>
+          <p:cNvPr id="8" name="Right Arrow 5"/>
+          <p:cNvSpPr/>
+          <p:nvPr/>
+        </p:nvSpPr>
+        <p:spPr>
+          <a:xfrm>
+            <a:off x="6443281" y="4014199"/>
+            <a:ext cx="411534" cy="543808"/>
+          </a:xfrm>
+          <a:prstGeom prst="rightArrow">
+            <a:avLst/>
+          </a:prstGeom>
+          <a:solidFill>
+            <a:srgbClr val="004B50"/>
+          </a:solidFill>
+          <a:ln>
+            <a:solidFill>
+              <a:schemeClr val="dk1"/>
+            </a:solidFill>
+          </a:ln>
+        </p:spPr>
+        <p:style>
+          <a:lnRef idx="2">
+            <a:schemeClr val="accent1">
+              <a:shade val="50000"/>
+            </a:schemeClr>
+          </a:lnRef>
+          <a:fillRef idx="1">
+            <a:schemeClr val="accent1"/>
+          </a:fillRef>
+          <a:effectRef idx="0">
+            <a:schemeClr val="accent1"/>
+          </a:effectRef>
+          <a:fontRef idx="minor">
+            <a:schemeClr val="lt1"/>
+          </a:fontRef>
+        </p:style>
+        <p:txBody>
+          <a:bodyPr rtlCol="0" anchor="ctr"/>
+          <a:lstStyle/>
+          <a:p>
+            <a:pPr algn="ctr"/>
+            <a:endParaRPr lang="en-US" dirty="0">
+              <a:solidFill>
+                <a:schemeClr val="bg1"/>
+              </a:solidFill>
+            </a:endParaRPr>
+          </a:p>
+        </p:txBody>
+      </p:sp>
     </p:spTree>
     <p:extLst>
       <p:ext uri="{BB962C8B-B14F-4D97-AF65-F5344CB8AC3E}">
@@ -23463,7 +23488,7 @@
         <p:spPr>
           <a:xfrm>
             <a:off x="838199" y="1860256"/>
-            <a:ext cx="3128231" cy="3807494"/>
+            <a:ext cx="3292367" cy="3807494"/>
           </a:xfrm>
           <a:prstGeom prst="rect">
             <a:avLst/>
@@ -23709,7 +23734,7 @@
       </p:sp>
       <p:pic>
         <p:nvPicPr>
-          <p:cNvPr id="4" name="Picture 3"/>
+          <p:cNvPr id="3" name="Picture 2"/>
           <p:cNvPicPr>
             <a:picLocks noChangeAspect="1"/>
           </p:cNvPicPr>
@@ -23723,8 +23748,8 @@
         </p:blipFill>
         <p:spPr>
           <a:xfrm>
-            <a:off x="4562333" y="1860256"/>
-            <a:ext cx="5516615" cy="3717574"/>
+            <a:off x="4884217" y="1984681"/>
+            <a:ext cx="5038684" cy="3774988"/>
           </a:xfrm>
           <a:prstGeom prst="rect">
             <a:avLst/>

</xml_diff>